<commit_message>
updated presentation & readme
</commit_message>
<xml_diff>
--- a/Presentation.pptx
+++ b/Presentation.pptx
@@ -5,15 +5,17 @@
     <p:sldMasterId id="2147483804" r:id="rId1"/>
   </p:sldMasterIdLst>
   <p:notesMasterIdLst>
-    <p:notesMasterId r:id="rId8"/>
+    <p:notesMasterId r:id="rId10"/>
   </p:notesMasterIdLst>
   <p:sldIdLst>
     <p:sldId id="256" r:id="rId2"/>
     <p:sldId id="260" r:id="rId3"/>
     <p:sldId id="258" r:id="rId4"/>
     <p:sldId id="259" r:id="rId5"/>
-    <p:sldId id="261" r:id="rId6"/>
-    <p:sldId id="262" r:id="rId7"/>
+    <p:sldId id="263" r:id="rId6"/>
+    <p:sldId id="264" r:id="rId7"/>
+    <p:sldId id="261" r:id="rId8"/>
+    <p:sldId id="262" r:id="rId9"/>
   </p:sldIdLst>
   <p:sldSz cx="12192000" cy="6858000"/>
   <p:notesSz cx="6858000" cy="9144000"/>
@@ -3760,11 +3762,14 @@
         <a:bodyPr/>
         <a:lstStyle/>
         <a:p>
+          <a:pPr>
+            <a:buFont typeface="Wingdings" panose="05000000000000000000" pitchFamily="2" charset="2"/>
+            <a:buChar char="§"/>
+          </a:pPr>
           <a:r>
-            <a:rPr lang="en-US"/>
+            <a:rPr lang="en-US" dirty="0"/>
             <a:t>Average income</a:t>
           </a:r>
-          <a:endParaRPr lang="en-US" dirty="0"/>
         </a:p>
       </dgm:t>
     </dgm:pt>
@@ -3797,11 +3802,14 @@
         <a:bodyPr/>
         <a:lstStyle/>
         <a:p>
+          <a:pPr>
+            <a:buFont typeface="Wingdings" panose="05000000000000000000" pitchFamily="2" charset="2"/>
+            <a:buChar char="§"/>
+          </a:pPr>
           <a:r>
-            <a:rPr lang="en-US"/>
+            <a:rPr lang="en-US" dirty="0"/>
             <a:t>GDP vs Population</a:t>
           </a:r>
-          <a:endParaRPr lang="en-US" dirty="0"/>
         </a:p>
       </dgm:t>
     </dgm:pt>
@@ -5501,13 +5509,13 @@
             <a:spcAft>
               <a:spcPct val="15000"/>
             </a:spcAft>
-            <a:buChar char="•"/>
+            <a:buFont typeface="Wingdings" panose="05000000000000000000" pitchFamily="2" charset="2"/>
+            <a:buChar char="§"/>
           </a:pPr>
           <a:r>
-            <a:rPr lang="en-US" sz="2500" kern="1200"/>
+            <a:rPr lang="en-US" sz="2500" kern="1200" dirty="0"/>
             <a:t>Average income</a:t>
           </a:r>
-          <a:endParaRPr lang="en-US" sz="2500" kern="1200" dirty="0"/>
         </a:p>
         <a:p>
           <a:pPr marL="457200" lvl="2" indent="-228600" algn="l" defTabSz="1111250">
@@ -5520,13 +5528,13 @@
             <a:spcAft>
               <a:spcPct val="15000"/>
             </a:spcAft>
-            <a:buChar char="•"/>
+            <a:buFont typeface="Wingdings" panose="05000000000000000000" pitchFamily="2" charset="2"/>
+            <a:buChar char="§"/>
           </a:pPr>
           <a:r>
-            <a:rPr lang="en-US" sz="2500" kern="1200"/>
+            <a:rPr lang="en-US" sz="2500" kern="1200" dirty="0"/>
             <a:t>GDP vs Population</a:t>
           </a:r>
-          <a:endParaRPr lang="en-US" sz="2500" kern="1200" dirty="0"/>
         </a:p>
         <a:p>
           <a:pPr marL="228600" lvl="1" indent="-228600" algn="l" defTabSz="1111250">
@@ -12828,6 +12836,90 @@
     </a:lvl9pPr>
   </p:notesStyle>
 </p:notesMaster>
+</file>
+
+<file path=ppt/notesSlides/notesSlide1.xml><?xml version="1.0" encoding="utf-8"?>
+<p:notes xmlns:a="http://schemas.openxmlformats.org/drawingml/2006/main" xmlns:r="http://schemas.openxmlformats.org/officeDocument/2006/relationships" xmlns:p="http://schemas.openxmlformats.org/presentationml/2006/main">
+  <p:cSld>
+    <p:spTree>
+      <p:nvGrpSpPr>
+        <p:cNvPr id="1" name=""/>
+        <p:cNvGrpSpPr/>
+        <p:nvPr/>
+      </p:nvGrpSpPr>
+      <p:grpSpPr>
+        <a:xfrm>
+          <a:off x="0" y="0"/>
+          <a:ext cx="0" cy="0"/>
+          <a:chOff x="0" y="0"/>
+          <a:chExt cx="0" cy="0"/>
+        </a:xfrm>
+      </p:grpSpPr>
+      <p:sp>
+        <p:nvSpPr>
+          <p:cNvPr id="2" name="Slide Image Placeholder 1"/>
+          <p:cNvSpPr>
+            <a:spLocks noGrp="1" noRot="1" noChangeAspect="1"/>
+          </p:cNvSpPr>
+          <p:nvPr>
+            <p:ph type="sldImg"/>
+          </p:nvPr>
+        </p:nvSpPr>
+        <p:spPr/>
+      </p:sp>
+      <p:sp>
+        <p:nvSpPr>
+          <p:cNvPr id="3" name="Notes Placeholder 2"/>
+          <p:cNvSpPr>
+            <a:spLocks noGrp="1"/>
+          </p:cNvSpPr>
+          <p:nvPr>
+            <p:ph type="body" idx="1"/>
+          </p:nvPr>
+        </p:nvSpPr>
+        <p:spPr/>
+        <p:txBody>
+          <a:bodyPr/>
+          <a:lstStyle/>
+          <a:p>
+            <a:endParaRPr lang="en-AU" dirty="0"/>
+          </a:p>
+        </p:txBody>
+      </p:sp>
+      <p:sp>
+        <p:nvSpPr>
+          <p:cNvPr id="4" name="Slide Number Placeholder 3"/>
+          <p:cNvSpPr>
+            <a:spLocks noGrp="1"/>
+          </p:cNvSpPr>
+          <p:nvPr>
+            <p:ph type="sldNum" sz="quarter" idx="5"/>
+          </p:nvPr>
+        </p:nvSpPr>
+        <p:spPr/>
+        <p:txBody>
+          <a:bodyPr/>
+          <a:lstStyle/>
+          <a:p>
+            <a:fld id="{010CE597-78A0-4769-A8FA-42EAD8C3E8D3}" type="slidenum">
+              <a:rPr lang="en-AU" smtClean="0"/>
+              <a:t>5</a:t>
+            </a:fld>
+            <a:endParaRPr lang="en-AU"/>
+          </a:p>
+        </p:txBody>
+      </p:sp>
+    </p:spTree>
+    <p:extLst>
+      <p:ext uri="{BB962C8B-B14F-4D97-AF65-F5344CB8AC3E}">
+        <p14:creationId xmlns:p14="http://schemas.microsoft.com/office/powerpoint/2010/main" val="1952932808"/>
+      </p:ext>
+    </p:extLst>
+  </p:cSld>
+  <p:clrMapOvr>
+    <a:masterClrMapping/>
+  </p:clrMapOvr>
+</p:notes>
 </file>
 
 <file path=ppt/slideLayouts/slideLayout1.xml><?xml version="1.0" encoding="utf-8"?>
@@ -21953,7 +22045,7 @@
           <p:nvPr>
             <p:extLst>
               <p:ext uri="{D42A27DB-BD31-4B8C-83A1-F6EECF244321}">
-                <p14:modId xmlns:p14="http://schemas.microsoft.com/office/powerpoint/2010/main" val="1583374506"/>
+                <p14:modId xmlns:p14="http://schemas.microsoft.com/office/powerpoint/2010/main" val="3934416652"/>
               </p:ext>
             </p:extLst>
           </p:nvPr>
@@ -21982,6 +22074,1163 @@
 </file>
 
 <file path=ppt/slides/slide5.xml><?xml version="1.0" encoding="utf-8"?>
+<p:sld xmlns:a="http://schemas.openxmlformats.org/drawingml/2006/main" xmlns:r="http://schemas.openxmlformats.org/officeDocument/2006/relationships" xmlns:p="http://schemas.openxmlformats.org/presentationml/2006/main">
+  <p:cSld>
+    <p:bg>
+      <p:bgPr>
+        <a:blipFill rotWithShape="1">
+          <a:blip r:embed="rId3">
+            <a:duotone>
+              <a:schemeClr val="bg2">
+                <a:shade val="76000"/>
+                <a:satMod val="180000"/>
+              </a:schemeClr>
+              <a:schemeClr val="bg2">
+                <a:tint val="80000"/>
+                <a:satMod val="120000"/>
+                <a:lumMod val="180000"/>
+              </a:schemeClr>
+            </a:duotone>
+          </a:blip>
+          <a:stretch/>
+        </a:blipFill>
+        <a:effectLst/>
+      </p:bgPr>
+    </p:bg>
+    <p:spTree>
+      <p:nvGrpSpPr>
+        <p:cNvPr id="1" name=""/>
+        <p:cNvGrpSpPr/>
+        <p:nvPr/>
+      </p:nvGrpSpPr>
+      <p:grpSpPr>
+        <a:xfrm>
+          <a:off x="0" y="0"/>
+          <a:ext cx="0" cy="0"/>
+          <a:chOff x="0" y="0"/>
+          <a:chExt cx="0" cy="0"/>
+        </a:xfrm>
+      </p:grpSpPr>
+      <p:grpSp>
+        <p:nvGrpSpPr>
+          <p:cNvPr id="57" name="Group 56">
+            <a:extLst>
+              <a:ext uri="{FF2B5EF4-FFF2-40B4-BE49-F238E27FC236}">
+                <a16:creationId xmlns:a16="http://schemas.microsoft.com/office/drawing/2014/main" id="{FDB0F91E-E08B-4543-B4C0-6DF9094A0106}"/>
+              </a:ext>
+              <a:ext uri="{C183D7F6-B498-43B3-948B-1728B52AA6E4}">
+                <adec:decorative xmlns:adec="http://schemas.microsoft.com/office/drawing/2017/decorative" val="1"/>
+              </a:ext>
+            </a:extLst>
+          </p:cNvPr>
+          <p:cNvGrpSpPr>
+            <a:grpSpLocks noGrp="1" noUngrp="1" noRot="1" noChangeAspect="1" noMove="1" noResize="1"/>
+          </p:cNvGrpSpPr>
+          <p:nvPr>
+            <p:extLst>
+              <p:ext uri="{386F3935-93C4-4BCD-93E2-E3B085C9AB24}">
+                <p16:designElem xmlns:p16="http://schemas.microsoft.com/office/powerpoint/2015/main" val="1"/>
+              </p:ext>
+            </p:extLst>
+          </p:nvPr>
+        </p:nvGrpSpPr>
+        <p:grpSpPr>
+          <a:xfrm>
+            <a:off x="150812" y="0"/>
+            <a:ext cx="2436813" cy="6858001"/>
+            <a:chOff x="1320800" y="0"/>
+            <a:chExt cx="2436813" cy="6858001"/>
+          </a:xfrm>
+        </p:grpSpPr>
+        <p:sp>
+          <p:nvSpPr>
+            <p:cNvPr id="58" name="Freeform 6">
+              <a:extLst>
+                <a:ext uri="{FF2B5EF4-FFF2-40B4-BE49-F238E27FC236}">
+                  <a16:creationId xmlns:a16="http://schemas.microsoft.com/office/drawing/2014/main" id="{CAA7E6E8-7988-4714-A434-6B552010B547}"/>
+                </a:ext>
+                <a:ext uri="{C183D7F6-B498-43B3-948B-1728B52AA6E4}">
+                  <adec:decorative xmlns:adec="http://schemas.microsoft.com/office/drawing/2017/decorative" val="1"/>
+                </a:ext>
+              </a:extLst>
+            </p:cNvPr>
+            <p:cNvSpPr/>
+            <p:nvPr>
+              <p:extLst>
+                <p:ext uri="{386F3935-93C4-4BCD-93E2-E3B085C9AB24}">
+                  <p16:designElem xmlns:p16="http://schemas.microsoft.com/office/powerpoint/2015/main" val="1"/>
+                </p:ext>
+              </p:extLst>
+            </p:nvPr>
+          </p:nvSpPr>
+          <p:spPr bwMode="auto">
+            <a:xfrm>
+              <a:off x="1627188" y="0"/>
+              <a:ext cx="1122363" cy="5329238"/>
+            </a:xfrm>
+            <a:custGeom>
+              <a:avLst/>
+              <a:gdLst/>
+              <a:ahLst/>
+              <a:cxnLst/>
+              <a:rect l="0" t="0" r="r" b="b"/>
+              <a:pathLst>
+                <a:path w="707" h="3357">
+                  <a:moveTo>
+                    <a:pt x="0" y="3330"/>
+                  </a:moveTo>
+                  <a:lnTo>
+                    <a:pt x="156" y="3357"/>
+                  </a:lnTo>
+                  <a:lnTo>
+                    <a:pt x="707" y="0"/>
+                  </a:lnTo>
+                  <a:lnTo>
+                    <a:pt x="547" y="0"/>
+                  </a:lnTo>
+                  <a:lnTo>
+                    <a:pt x="0" y="3330"/>
+                  </a:lnTo>
+                  <a:close/>
+                </a:path>
+              </a:pathLst>
+            </a:custGeom>
+            <a:solidFill>
+              <a:schemeClr val="accent1"/>
+            </a:solidFill>
+            <a:ln>
+              <a:noFill/>
+            </a:ln>
+          </p:spPr>
+          <p:txBody>
+            <a:bodyPr/>
+            <a:lstStyle/>
+            <a:p>
+              <a:endParaRPr lang="en-AU"/>
+            </a:p>
+          </p:txBody>
+        </p:sp>
+        <p:sp>
+          <p:nvSpPr>
+            <p:cNvPr id="59" name="Freeform 7">
+              <a:extLst>
+                <a:ext uri="{FF2B5EF4-FFF2-40B4-BE49-F238E27FC236}">
+                  <a16:creationId xmlns:a16="http://schemas.microsoft.com/office/drawing/2014/main" id="{A2736B6B-CF60-477E-8405-C77A6B60D519}"/>
+                </a:ext>
+                <a:ext uri="{C183D7F6-B498-43B3-948B-1728B52AA6E4}">
+                  <adec:decorative xmlns:adec="http://schemas.microsoft.com/office/drawing/2017/decorative" val="1"/>
+                </a:ext>
+              </a:extLst>
+            </p:cNvPr>
+            <p:cNvSpPr/>
+            <p:nvPr>
+              <p:extLst>
+                <p:ext uri="{386F3935-93C4-4BCD-93E2-E3B085C9AB24}">
+                  <p16:designElem xmlns:p16="http://schemas.microsoft.com/office/powerpoint/2015/main" val="1"/>
+                </p:ext>
+              </p:extLst>
+            </p:nvPr>
+          </p:nvSpPr>
+          <p:spPr bwMode="auto">
+            <a:xfrm>
+              <a:off x="1320800" y="0"/>
+              <a:ext cx="1117600" cy="5276850"/>
+            </a:xfrm>
+            <a:custGeom>
+              <a:avLst/>
+              <a:gdLst/>
+              <a:ahLst/>
+              <a:cxnLst/>
+              <a:rect l="0" t="0" r="r" b="b"/>
+              <a:pathLst>
+                <a:path w="704" h="3324">
+                  <a:moveTo>
+                    <a:pt x="704" y="0"/>
+                  </a:moveTo>
+                  <a:lnTo>
+                    <a:pt x="545" y="0"/>
+                  </a:lnTo>
+                  <a:lnTo>
+                    <a:pt x="0" y="3300"/>
+                  </a:lnTo>
+                  <a:lnTo>
+                    <a:pt x="157" y="3324"/>
+                  </a:lnTo>
+                  <a:lnTo>
+                    <a:pt x="704" y="0"/>
+                  </a:lnTo>
+                  <a:close/>
+                </a:path>
+              </a:pathLst>
+            </a:custGeom>
+            <a:solidFill>
+              <a:schemeClr val="tx1">
+                <a:lumMod val="65000"/>
+                <a:lumOff val="35000"/>
+              </a:schemeClr>
+            </a:solidFill>
+            <a:ln>
+              <a:noFill/>
+            </a:ln>
+          </p:spPr>
+          <p:txBody>
+            <a:bodyPr/>
+            <a:lstStyle/>
+            <a:p>
+              <a:endParaRPr lang="en-AU"/>
+            </a:p>
+          </p:txBody>
+        </p:sp>
+        <p:sp>
+          <p:nvSpPr>
+            <p:cNvPr id="60" name="Freeform 8">
+              <a:extLst>
+                <a:ext uri="{FF2B5EF4-FFF2-40B4-BE49-F238E27FC236}">
+                  <a16:creationId xmlns:a16="http://schemas.microsoft.com/office/drawing/2014/main" id="{96C54F74-7D7A-4327-AC54-03A0C30CA132}"/>
+                </a:ext>
+                <a:ext uri="{C183D7F6-B498-43B3-948B-1728B52AA6E4}">
+                  <adec:decorative xmlns:adec="http://schemas.microsoft.com/office/drawing/2017/decorative" val="1"/>
+                </a:ext>
+              </a:extLst>
+            </p:cNvPr>
+            <p:cNvSpPr/>
+            <p:nvPr>
+              <p:extLst>
+                <p:ext uri="{386F3935-93C4-4BCD-93E2-E3B085C9AB24}">
+                  <p16:designElem xmlns:p16="http://schemas.microsoft.com/office/powerpoint/2015/main" val="1"/>
+                </p:ext>
+              </p:extLst>
+            </p:nvPr>
+          </p:nvSpPr>
+          <p:spPr bwMode="auto">
+            <a:xfrm>
+              <a:off x="1320800" y="5238750"/>
+              <a:ext cx="1228725" cy="1619250"/>
+            </a:xfrm>
+            <a:custGeom>
+              <a:avLst/>
+              <a:gdLst/>
+              <a:ahLst/>
+              <a:cxnLst/>
+              <a:rect l="0" t="0" r="r" b="b"/>
+              <a:pathLst>
+                <a:path w="774" h="1020">
+                  <a:moveTo>
+                    <a:pt x="0" y="0"/>
+                  </a:moveTo>
+                  <a:lnTo>
+                    <a:pt x="740" y="1020"/>
+                  </a:lnTo>
+                  <a:lnTo>
+                    <a:pt x="774" y="1020"/>
+                  </a:lnTo>
+                  <a:lnTo>
+                    <a:pt x="0" y="0"/>
+                  </a:lnTo>
+                  <a:close/>
+                </a:path>
+              </a:pathLst>
+            </a:custGeom>
+            <a:solidFill>
+              <a:schemeClr val="tx1">
+                <a:lumMod val="85000"/>
+                <a:lumOff val="15000"/>
+              </a:schemeClr>
+            </a:solidFill>
+            <a:ln>
+              <a:noFill/>
+            </a:ln>
+          </p:spPr>
+          <p:txBody>
+            <a:bodyPr/>
+            <a:lstStyle/>
+            <a:p>
+              <a:endParaRPr lang="en-AU"/>
+            </a:p>
+          </p:txBody>
+        </p:sp>
+        <p:sp>
+          <p:nvSpPr>
+            <p:cNvPr id="61" name="Freeform 9">
+              <a:extLst>
+                <a:ext uri="{FF2B5EF4-FFF2-40B4-BE49-F238E27FC236}">
+                  <a16:creationId xmlns:a16="http://schemas.microsoft.com/office/drawing/2014/main" id="{40790CC2-4075-407E-B51B-01EBAB18A02B}"/>
+                </a:ext>
+                <a:ext uri="{C183D7F6-B498-43B3-948B-1728B52AA6E4}">
+                  <adec:decorative xmlns:adec="http://schemas.microsoft.com/office/drawing/2017/decorative" val="1"/>
+                </a:ext>
+              </a:extLst>
+            </p:cNvPr>
+            <p:cNvSpPr/>
+            <p:nvPr>
+              <p:extLst>
+                <p:ext uri="{386F3935-93C4-4BCD-93E2-E3B085C9AB24}">
+                  <p16:designElem xmlns:p16="http://schemas.microsoft.com/office/powerpoint/2015/main" val="1"/>
+                </p:ext>
+              </p:extLst>
+            </p:nvPr>
+          </p:nvSpPr>
+          <p:spPr bwMode="auto">
+            <a:xfrm>
+              <a:off x="1627188" y="5291138"/>
+              <a:ext cx="1495425" cy="1566863"/>
+            </a:xfrm>
+            <a:custGeom>
+              <a:avLst/>
+              <a:gdLst/>
+              <a:ahLst/>
+              <a:cxnLst/>
+              <a:rect l="0" t="0" r="r" b="b"/>
+              <a:pathLst>
+                <a:path w="942" h="987">
+                  <a:moveTo>
+                    <a:pt x="0" y="0"/>
+                  </a:moveTo>
+                  <a:lnTo>
+                    <a:pt x="909" y="987"/>
+                  </a:lnTo>
+                  <a:lnTo>
+                    <a:pt x="942" y="987"/>
+                  </a:lnTo>
+                  <a:lnTo>
+                    <a:pt x="0" y="0"/>
+                  </a:lnTo>
+                  <a:close/>
+                </a:path>
+              </a:pathLst>
+            </a:custGeom>
+            <a:solidFill>
+              <a:schemeClr val="accent1">
+                <a:lumMod val="50000"/>
+              </a:schemeClr>
+            </a:solidFill>
+            <a:ln>
+              <a:noFill/>
+            </a:ln>
+          </p:spPr>
+          <p:txBody>
+            <a:bodyPr/>
+            <a:lstStyle/>
+            <a:p>
+              <a:endParaRPr lang="en-AU"/>
+            </a:p>
+          </p:txBody>
+        </p:sp>
+        <p:sp>
+          <p:nvSpPr>
+            <p:cNvPr id="44" name="Freeform 10">
+              <a:extLst>
+                <a:ext uri="{FF2B5EF4-FFF2-40B4-BE49-F238E27FC236}">
+                  <a16:creationId xmlns:a16="http://schemas.microsoft.com/office/drawing/2014/main" id="{808D79CE-C1DC-4640-82F8-32DDB31DF496}"/>
+                </a:ext>
+                <a:ext uri="{C183D7F6-B498-43B3-948B-1728B52AA6E4}">
+                  <adec:decorative xmlns:adec="http://schemas.microsoft.com/office/drawing/2017/decorative" val="1"/>
+                </a:ext>
+              </a:extLst>
+            </p:cNvPr>
+            <p:cNvSpPr/>
+            <p:nvPr>
+              <p:extLst>
+                <p:ext uri="{386F3935-93C4-4BCD-93E2-E3B085C9AB24}">
+                  <p16:designElem xmlns:p16="http://schemas.microsoft.com/office/powerpoint/2015/main" val="1"/>
+                </p:ext>
+              </p:extLst>
+            </p:nvPr>
+          </p:nvSpPr>
+          <p:spPr bwMode="auto">
+            <a:xfrm>
+              <a:off x="1627188" y="5286375"/>
+              <a:ext cx="2130425" cy="1571625"/>
+            </a:xfrm>
+            <a:custGeom>
+              <a:avLst/>
+              <a:gdLst/>
+              <a:ahLst/>
+              <a:cxnLst/>
+              <a:rect l="0" t="0" r="r" b="b"/>
+              <a:pathLst>
+                <a:path w="1342" h="990">
+                  <a:moveTo>
+                    <a:pt x="0" y="3"/>
+                  </a:moveTo>
+                  <a:lnTo>
+                    <a:pt x="942" y="990"/>
+                  </a:lnTo>
+                  <a:lnTo>
+                    <a:pt x="1342" y="990"/>
+                  </a:lnTo>
+                  <a:lnTo>
+                    <a:pt x="156" y="27"/>
+                  </a:lnTo>
+                  <a:lnTo>
+                    <a:pt x="0" y="0"/>
+                  </a:lnTo>
+                  <a:lnTo>
+                    <a:pt x="0" y="3"/>
+                  </a:lnTo>
+                  <a:close/>
+                </a:path>
+              </a:pathLst>
+            </a:custGeom>
+            <a:solidFill>
+              <a:schemeClr val="accent1">
+                <a:lumMod val="75000"/>
+              </a:schemeClr>
+            </a:solidFill>
+            <a:ln>
+              <a:noFill/>
+            </a:ln>
+          </p:spPr>
+          <p:txBody>
+            <a:bodyPr/>
+            <a:lstStyle/>
+            <a:p>
+              <a:endParaRPr lang="en-AU"/>
+            </a:p>
+          </p:txBody>
+        </p:sp>
+        <p:sp>
+          <p:nvSpPr>
+            <p:cNvPr id="62" name="Freeform 11">
+              <a:extLst>
+                <a:ext uri="{FF2B5EF4-FFF2-40B4-BE49-F238E27FC236}">
+                  <a16:creationId xmlns:a16="http://schemas.microsoft.com/office/drawing/2014/main" id="{7690EB4B-9665-453E-A536-FA9DA06D1C9E}"/>
+                </a:ext>
+                <a:ext uri="{C183D7F6-B498-43B3-948B-1728B52AA6E4}">
+                  <adec:decorative xmlns:adec="http://schemas.microsoft.com/office/drawing/2017/decorative" val="1"/>
+                </a:ext>
+              </a:extLst>
+            </p:cNvPr>
+            <p:cNvSpPr/>
+            <p:nvPr>
+              <p:extLst>
+                <p:ext uri="{386F3935-93C4-4BCD-93E2-E3B085C9AB24}">
+                  <p16:designElem xmlns:p16="http://schemas.microsoft.com/office/powerpoint/2015/main" val="1"/>
+                </p:ext>
+              </p:extLst>
+            </p:nvPr>
+          </p:nvSpPr>
+          <p:spPr bwMode="auto">
+            <a:xfrm>
+              <a:off x="1320800" y="5238750"/>
+              <a:ext cx="1695450" cy="1619250"/>
+            </a:xfrm>
+            <a:custGeom>
+              <a:avLst/>
+              <a:gdLst/>
+              <a:ahLst/>
+              <a:cxnLst/>
+              <a:rect l="0" t="0" r="r" b="b"/>
+              <a:pathLst>
+                <a:path w="1068" h="1020">
+                  <a:moveTo>
+                    <a:pt x="1068" y="1020"/>
+                  </a:moveTo>
+                  <a:lnTo>
+                    <a:pt x="184" y="60"/>
+                  </a:lnTo>
+                  <a:lnTo>
+                    <a:pt x="154" y="27"/>
+                  </a:lnTo>
+                  <a:lnTo>
+                    <a:pt x="157" y="27"/>
+                  </a:lnTo>
+                  <a:lnTo>
+                    <a:pt x="157" y="24"/>
+                  </a:lnTo>
+                  <a:lnTo>
+                    <a:pt x="154" y="24"/>
+                  </a:lnTo>
+                  <a:lnTo>
+                    <a:pt x="0" y="0"/>
+                  </a:lnTo>
+                  <a:lnTo>
+                    <a:pt x="0" y="0"/>
+                  </a:lnTo>
+                  <a:lnTo>
+                    <a:pt x="774" y="1020"/>
+                  </a:lnTo>
+                  <a:lnTo>
+                    <a:pt x="1068" y="1020"/>
+                  </a:lnTo>
+                  <a:close/>
+                </a:path>
+              </a:pathLst>
+            </a:custGeom>
+            <a:solidFill>
+              <a:schemeClr val="tx1">
+                <a:lumMod val="75000"/>
+                <a:lumOff val="25000"/>
+              </a:schemeClr>
+            </a:solidFill>
+            <a:ln>
+              <a:noFill/>
+            </a:ln>
+          </p:spPr>
+          <p:txBody>
+            <a:bodyPr/>
+            <a:lstStyle/>
+            <a:p>
+              <a:endParaRPr lang="en-AU"/>
+            </a:p>
+          </p:txBody>
+        </p:sp>
+      </p:grpSp>
+      <p:grpSp>
+        <p:nvGrpSpPr>
+          <p:cNvPr id="63" name="Group 62">
+            <a:extLst>
+              <a:ext uri="{FF2B5EF4-FFF2-40B4-BE49-F238E27FC236}">
+                <a16:creationId xmlns:a16="http://schemas.microsoft.com/office/drawing/2014/main" id="{2DAE90E3-8F91-4218-8153-F632799FB076}"/>
+              </a:ext>
+              <a:ext uri="{C183D7F6-B498-43B3-948B-1728B52AA6E4}">
+                <adec:decorative xmlns:adec="http://schemas.microsoft.com/office/drawing/2017/decorative" val="1"/>
+              </a:ext>
+            </a:extLst>
+          </p:cNvPr>
+          <p:cNvGrpSpPr>
+            <a:grpSpLocks noGrp="1" noUngrp="1" noRot="1" noChangeAspect="1" noMove="1" noResize="1"/>
+          </p:cNvGrpSpPr>
+          <p:nvPr>
+            <p:extLst>
+              <p:ext uri="{386F3935-93C4-4BCD-93E2-E3B085C9AB24}">
+                <p16:designElem xmlns:p16="http://schemas.microsoft.com/office/powerpoint/2015/main" val="1"/>
+              </p:ext>
+            </p:extLst>
+          </p:nvPr>
+        </p:nvGrpSpPr>
+        <p:grpSpPr>
+          <a:xfrm>
+            <a:off x="150812" y="0"/>
+            <a:ext cx="2436813" cy="6858001"/>
+            <a:chOff x="1320800" y="0"/>
+            <a:chExt cx="2436813" cy="6858001"/>
+          </a:xfrm>
+        </p:grpSpPr>
+        <p:sp>
+          <p:nvSpPr>
+            <p:cNvPr id="64" name="Freeform 6">
+              <a:extLst>
+                <a:ext uri="{FF2B5EF4-FFF2-40B4-BE49-F238E27FC236}">
+                  <a16:creationId xmlns:a16="http://schemas.microsoft.com/office/drawing/2014/main" id="{C1DC6993-96FE-4235-985E-52489B4237A3}"/>
+                </a:ext>
+                <a:ext uri="{C183D7F6-B498-43B3-948B-1728B52AA6E4}">
+                  <adec:decorative xmlns:adec="http://schemas.microsoft.com/office/drawing/2017/decorative" val="1"/>
+                </a:ext>
+              </a:extLst>
+            </p:cNvPr>
+            <p:cNvSpPr/>
+            <p:nvPr>
+              <p:extLst>
+                <p:ext uri="{386F3935-93C4-4BCD-93E2-E3B085C9AB24}">
+                  <p16:designElem xmlns:p16="http://schemas.microsoft.com/office/powerpoint/2015/main" val="1"/>
+                </p:ext>
+              </p:extLst>
+            </p:nvPr>
+          </p:nvSpPr>
+          <p:spPr bwMode="auto">
+            <a:xfrm>
+              <a:off x="1627188" y="0"/>
+              <a:ext cx="1122363" cy="5329238"/>
+            </a:xfrm>
+            <a:custGeom>
+              <a:avLst/>
+              <a:gdLst/>
+              <a:ahLst/>
+              <a:cxnLst/>
+              <a:rect l="0" t="0" r="r" b="b"/>
+              <a:pathLst>
+                <a:path w="707" h="3357">
+                  <a:moveTo>
+                    <a:pt x="0" y="3330"/>
+                  </a:moveTo>
+                  <a:lnTo>
+                    <a:pt x="156" y="3357"/>
+                  </a:lnTo>
+                  <a:lnTo>
+                    <a:pt x="707" y="0"/>
+                  </a:lnTo>
+                  <a:lnTo>
+                    <a:pt x="547" y="0"/>
+                  </a:lnTo>
+                  <a:lnTo>
+                    <a:pt x="0" y="3330"/>
+                  </a:lnTo>
+                  <a:close/>
+                </a:path>
+              </a:pathLst>
+            </a:custGeom>
+            <a:solidFill>
+              <a:schemeClr val="accent1"/>
+            </a:solidFill>
+            <a:ln>
+              <a:noFill/>
+            </a:ln>
+          </p:spPr>
+          <p:txBody>
+            <a:bodyPr/>
+            <a:lstStyle/>
+            <a:p>
+              <a:endParaRPr lang="en-AU"/>
+            </a:p>
+          </p:txBody>
+        </p:sp>
+        <p:sp>
+          <p:nvSpPr>
+            <p:cNvPr id="65" name="Freeform 7">
+              <a:extLst>
+                <a:ext uri="{FF2B5EF4-FFF2-40B4-BE49-F238E27FC236}">
+                  <a16:creationId xmlns:a16="http://schemas.microsoft.com/office/drawing/2014/main" id="{76D3DE8D-3DEC-4FF8-B4FC-1DAB2036441A}"/>
+                </a:ext>
+                <a:ext uri="{C183D7F6-B498-43B3-948B-1728B52AA6E4}">
+                  <adec:decorative xmlns:adec="http://schemas.microsoft.com/office/drawing/2017/decorative" val="1"/>
+                </a:ext>
+              </a:extLst>
+            </p:cNvPr>
+            <p:cNvSpPr/>
+            <p:nvPr>
+              <p:extLst>
+                <p:ext uri="{386F3935-93C4-4BCD-93E2-E3B085C9AB24}">
+                  <p16:designElem xmlns:p16="http://schemas.microsoft.com/office/powerpoint/2015/main" val="1"/>
+                </p:ext>
+              </p:extLst>
+            </p:nvPr>
+          </p:nvSpPr>
+          <p:spPr bwMode="auto">
+            <a:xfrm>
+              <a:off x="1320800" y="0"/>
+              <a:ext cx="1117600" cy="5276850"/>
+            </a:xfrm>
+            <a:custGeom>
+              <a:avLst/>
+              <a:gdLst/>
+              <a:ahLst/>
+              <a:cxnLst/>
+              <a:rect l="0" t="0" r="r" b="b"/>
+              <a:pathLst>
+                <a:path w="704" h="3324">
+                  <a:moveTo>
+                    <a:pt x="704" y="0"/>
+                  </a:moveTo>
+                  <a:lnTo>
+                    <a:pt x="545" y="0"/>
+                  </a:lnTo>
+                  <a:lnTo>
+                    <a:pt x="0" y="3300"/>
+                  </a:lnTo>
+                  <a:lnTo>
+                    <a:pt x="157" y="3324"/>
+                  </a:lnTo>
+                  <a:lnTo>
+                    <a:pt x="704" y="0"/>
+                  </a:lnTo>
+                  <a:close/>
+                </a:path>
+              </a:pathLst>
+            </a:custGeom>
+            <a:solidFill>
+              <a:schemeClr val="tx1">
+                <a:lumMod val="65000"/>
+                <a:lumOff val="35000"/>
+              </a:schemeClr>
+            </a:solidFill>
+            <a:ln>
+              <a:noFill/>
+            </a:ln>
+          </p:spPr>
+          <p:txBody>
+            <a:bodyPr/>
+            <a:lstStyle/>
+            <a:p>
+              <a:endParaRPr lang="en-AU"/>
+            </a:p>
+          </p:txBody>
+        </p:sp>
+        <p:sp>
+          <p:nvSpPr>
+            <p:cNvPr id="66" name="Freeform 8">
+              <a:extLst>
+                <a:ext uri="{FF2B5EF4-FFF2-40B4-BE49-F238E27FC236}">
+                  <a16:creationId xmlns:a16="http://schemas.microsoft.com/office/drawing/2014/main" id="{679297AF-1418-41DB-A81A-D77E0CAF4956}"/>
+                </a:ext>
+                <a:ext uri="{C183D7F6-B498-43B3-948B-1728B52AA6E4}">
+                  <adec:decorative xmlns:adec="http://schemas.microsoft.com/office/drawing/2017/decorative" val="1"/>
+                </a:ext>
+              </a:extLst>
+            </p:cNvPr>
+            <p:cNvSpPr/>
+            <p:nvPr>
+              <p:extLst>
+                <p:ext uri="{386F3935-93C4-4BCD-93E2-E3B085C9AB24}">
+                  <p16:designElem xmlns:p16="http://schemas.microsoft.com/office/powerpoint/2015/main" val="1"/>
+                </p:ext>
+              </p:extLst>
+            </p:nvPr>
+          </p:nvSpPr>
+          <p:spPr bwMode="auto">
+            <a:xfrm>
+              <a:off x="1320800" y="5238750"/>
+              <a:ext cx="1228725" cy="1619250"/>
+            </a:xfrm>
+            <a:custGeom>
+              <a:avLst/>
+              <a:gdLst/>
+              <a:ahLst/>
+              <a:cxnLst/>
+              <a:rect l="0" t="0" r="r" b="b"/>
+              <a:pathLst>
+                <a:path w="774" h="1020">
+                  <a:moveTo>
+                    <a:pt x="0" y="0"/>
+                  </a:moveTo>
+                  <a:lnTo>
+                    <a:pt x="740" y="1020"/>
+                  </a:lnTo>
+                  <a:lnTo>
+                    <a:pt x="774" y="1020"/>
+                  </a:lnTo>
+                  <a:lnTo>
+                    <a:pt x="0" y="0"/>
+                  </a:lnTo>
+                  <a:close/>
+                </a:path>
+              </a:pathLst>
+            </a:custGeom>
+            <a:solidFill>
+              <a:schemeClr val="tx1">
+                <a:lumMod val="85000"/>
+                <a:lumOff val="15000"/>
+              </a:schemeClr>
+            </a:solidFill>
+            <a:ln>
+              <a:noFill/>
+            </a:ln>
+          </p:spPr>
+          <p:txBody>
+            <a:bodyPr/>
+            <a:lstStyle/>
+            <a:p>
+              <a:endParaRPr lang="en-AU"/>
+            </a:p>
+          </p:txBody>
+        </p:sp>
+        <p:sp>
+          <p:nvSpPr>
+            <p:cNvPr id="67" name="Freeform 9">
+              <a:extLst>
+                <a:ext uri="{FF2B5EF4-FFF2-40B4-BE49-F238E27FC236}">
+                  <a16:creationId xmlns:a16="http://schemas.microsoft.com/office/drawing/2014/main" id="{F6AD388B-2E71-431B-90AB-B2F71F9F9DDC}"/>
+                </a:ext>
+                <a:ext uri="{C183D7F6-B498-43B3-948B-1728B52AA6E4}">
+                  <adec:decorative xmlns:adec="http://schemas.microsoft.com/office/drawing/2017/decorative" val="1"/>
+                </a:ext>
+              </a:extLst>
+            </p:cNvPr>
+            <p:cNvSpPr/>
+            <p:nvPr>
+              <p:extLst>
+                <p:ext uri="{386F3935-93C4-4BCD-93E2-E3B085C9AB24}">
+                  <p16:designElem xmlns:p16="http://schemas.microsoft.com/office/powerpoint/2015/main" val="1"/>
+                </p:ext>
+              </p:extLst>
+            </p:nvPr>
+          </p:nvSpPr>
+          <p:spPr bwMode="auto">
+            <a:xfrm>
+              <a:off x="1627188" y="5291138"/>
+              <a:ext cx="1495425" cy="1566863"/>
+            </a:xfrm>
+            <a:custGeom>
+              <a:avLst/>
+              <a:gdLst/>
+              <a:ahLst/>
+              <a:cxnLst/>
+              <a:rect l="0" t="0" r="r" b="b"/>
+              <a:pathLst>
+                <a:path w="942" h="987">
+                  <a:moveTo>
+                    <a:pt x="0" y="0"/>
+                  </a:moveTo>
+                  <a:lnTo>
+                    <a:pt x="909" y="987"/>
+                  </a:lnTo>
+                  <a:lnTo>
+                    <a:pt x="942" y="987"/>
+                  </a:lnTo>
+                  <a:lnTo>
+                    <a:pt x="0" y="0"/>
+                  </a:lnTo>
+                  <a:close/>
+                </a:path>
+              </a:pathLst>
+            </a:custGeom>
+            <a:solidFill>
+              <a:schemeClr val="accent1">
+                <a:lumMod val="50000"/>
+              </a:schemeClr>
+            </a:solidFill>
+            <a:ln>
+              <a:noFill/>
+            </a:ln>
+          </p:spPr>
+          <p:txBody>
+            <a:bodyPr/>
+            <a:lstStyle/>
+            <a:p>
+              <a:endParaRPr lang="en-AU"/>
+            </a:p>
+          </p:txBody>
+        </p:sp>
+        <p:sp>
+          <p:nvSpPr>
+            <p:cNvPr id="68" name="Freeform 10">
+              <a:extLst>
+                <a:ext uri="{FF2B5EF4-FFF2-40B4-BE49-F238E27FC236}">
+                  <a16:creationId xmlns:a16="http://schemas.microsoft.com/office/drawing/2014/main" id="{FA9972D4-1E8B-4A06-BD7C-B5140A3895FC}"/>
+                </a:ext>
+                <a:ext uri="{C183D7F6-B498-43B3-948B-1728B52AA6E4}">
+                  <adec:decorative xmlns:adec="http://schemas.microsoft.com/office/drawing/2017/decorative" val="1"/>
+                </a:ext>
+              </a:extLst>
+            </p:cNvPr>
+            <p:cNvSpPr/>
+            <p:nvPr>
+              <p:extLst>
+                <p:ext uri="{386F3935-93C4-4BCD-93E2-E3B085C9AB24}">
+                  <p16:designElem xmlns:p16="http://schemas.microsoft.com/office/powerpoint/2015/main" val="1"/>
+                </p:ext>
+              </p:extLst>
+            </p:nvPr>
+          </p:nvSpPr>
+          <p:spPr bwMode="auto">
+            <a:xfrm>
+              <a:off x="1627188" y="5286375"/>
+              <a:ext cx="2130425" cy="1571625"/>
+            </a:xfrm>
+            <a:custGeom>
+              <a:avLst/>
+              <a:gdLst/>
+              <a:ahLst/>
+              <a:cxnLst/>
+              <a:rect l="0" t="0" r="r" b="b"/>
+              <a:pathLst>
+                <a:path w="1342" h="990">
+                  <a:moveTo>
+                    <a:pt x="0" y="3"/>
+                  </a:moveTo>
+                  <a:lnTo>
+                    <a:pt x="942" y="990"/>
+                  </a:lnTo>
+                  <a:lnTo>
+                    <a:pt x="1342" y="990"/>
+                  </a:lnTo>
+                  <a:lnTo>
+                    <a:pt x="156" y="27"/>
+                  </a:lnTo>
+                  <a:lnTo>
+                    <a:pt x="0" y="0"/>
+                  </a:lnTo>
+                  <a:lnTo>
+                    <a:pt x="0" y="3"/>
+                  </a:lnTo>
+                  <a:close/>
+                </a:path>
+              </a:pathLst>
+            </a:custGeom>
+            <a:solidFill>
+              <a:schemeClr val="accent1">
+                <a:lumMod val="75000"/>
+              </a:schemeClr>
+            </a:solidFill>
+            <a:ln>
+              <a:noFill/>
+            </a:ln>
+          </p:spPr>
+          <p:txBody>
+            <a:bodyPr/>
+            <a:lstStyle/>
+            <a:p>
+              <a:endParaRPr lang="en-AU"/>
+            </a:p>
+          </p:txBody>
+        </p:sp>
+        <p:sp>
+          <p:nvSpPr>
+            <p:cNvPr id="69" name="Freeform 11">
+              <a:extLst>
+                <a:ext uri="{FF2B5EF4-FFF2-40B4-BE49-F238E27FC236}">
+                  <a16:creationId xmlns:a16="http://schemas.microsoft.com/office/drawing/2014/main" id="{528281FC-5068-4A18-832D-B47A0F1AC6E6}"/>
+                </a:ext>
+                <a:ext uri="{C183D7F6-B498-43B3-948B-1728B52AA6E4}">
+                  <adec:decorative xmlns:adec="http://schemas.microsoft.com/office/drawing/2017/decorative" val="1"/>
+                </a:ext>
+              </a:extLst>
+            </p:cNvPr>
+            <p:cNvSpPr/>
+            <p:nvPr>
+              <p:extLst>
+                <p:ext uri="{386F3935-93C4-4BCD-93E2-E3B085C9AB24}">
+                  <p16:designElem xmlns:p16="http://schemas.microsoft.com/office/powerpoint/2015/main" val="1"/>
+                </p:ext>
+              </p:extLst>
+            </p:nvPr>
+          </p:nvSpPr>
+          <p:spPr bwMode="auto">
+            <a:xfrm>
+              <a:off x="1320800" y="5238750"/>
+              <a:ext cx="1695450" cy="1619250"/>
+            </a:xfrm>
+            <a:custGeom>
+              <a:avLst/>
+              <a:gdLst/>
+              <a:ahLst/>
+              <a:cxnLst/>
+              <a:rect l="0" t="0" r="r" b="b"/>
+              <a:pathLst>
+                <a:path w="1068" h="1020">
+                  <a:moveTo>
+                    <a:pt x="1068" y="1020"/>
+                  </a:moveTo>
+                  <a:lnTo>
+                    <a:pt x="184" y="60"/>
+                  </a:lnTo>
+                  <a:lnTo>
+                    <a:pt x="154" y="27"/>
+                  </a:lnTo>
+                  <a:lnTo>
+                    <a:pt x="157" y="27"/>
+                  </a:lnTo>
+                  <a:lnTo>
+                    <a:pt x="157" y="24"/>
+                  </a:lnTo>
+                  <a:lnTo>
+                    <a:pt x="154" y="24"/>
+                  </a:lnTo>
+                  <a:lnTo>
+                    <a:pt x="0" y="0"/>
+                  </a:lnTo>
+                  <a:lnTo>
+                    <a:pt x="0" y="0"/>
+                  </a:lnTo>
+                  <a:lnTo>
+                    <a:pt x="774" y="1020"/>
+                  </a:lnTo>
+                  <a:lnTo>
+                    <a:pt x="1068" y="1020"/>
+                  </a:lnTo>
+                  <a:close/>
+                </a:path>
+              </a:pathLst>
+            </a:custGeom>
+            <a:solidFill>
+              <a:schemeClr val="tx1">
+                <a:lumMod val="75000"/>
+                <a:lumOff val="25000"/>
+              </a:schemeClr>
+            </a:solidFill>
+            <a:ln>
+              <a:noFill/>
+            </a:ln>
+          </p:spPr>
+          <p:txBody>
+            <a:bodyPr/>
+            <a:lstStyle/>
+            <a:p>
+              <a:endParaRPr lang="en-AU"/>
+            </a:p>
+          </p:txBody>
+        </p:sp>
+      </p:grpSp>
+      <p:pic>
+        <p:nvPicPr>
+          <p:cNvPr id="56" name="Content Placeholder 55" descr="A graph of different colored lines&#10;&#10;Description automatically generated">
+            <a:extLst>
+              <a:ext uri="{FF2B5EF4-FFF2-40B4-BE49-F238E27FC236}">
+                <a16:creationId xmlns:a16="http://schemas.microsoft.com/office/drawing/2014/main" id="{C7943034-2999-A311-7058-0E403556444F}"/>
+              </a:ext>
+            </a:extLst>
+          </p:cNvPr>
+          <p:cNvPicPr>
+            <a:picLocks noGrp="1" noChangeAspect="1"/>
+          </p:cNvPicPr>
+          <p:nvPr>
+            <p:ph sz="half" idx="1"/>
+          </p:nvPr>
+        </p:nvPicPr>
+        <p:blipFill>
+          <a:blip r:embed="rId4">
+            <a:extLst>
+              <a:ext uri="{28A0092B-C50C-407E-A947-70E740481C1C}">
+                <a14:useLocalDpi xmlns:a14="http://schemas.microsoft.com/office/drawing/2010/main" val="0"/>
+              </a:ext>
+            </a:extLst>
+          </a:blip>
+          <a:stretch>
+            <a:fillRect/>
+          </a:stretch>
+        </p:blipFill>
+        <p:spPr>
+          <a:xfrm>
+            <a:off x="150812" y="106532"/>
+            <a:ext cx="11890376" cy="6622742"/>
+          </a:xfrm>
+        </p:spPr>
+      </p:pic>
+    </p:spTree>
+    <p:extLst>
+      <p:ext uri="{BB962C8B-B14F-4D97-AF65-F5344CB8AC3E}">
+        <p14:creationId xmlns:p14="http://schemas.microsoft.com/office/powerpoint/2010/main" val="1012854074"/>
+      </p:ext>
+    </p:extLst>
+  </p:cSld>
+  <p:clrMapOvr>
+    <a:masterClrMapping/>
+  </p:clrMapOvr>
+</p:sld>
+</file>
+
+<file path=ppt/slides/slide6.xml><?xml version="1.0" encoding="utf-8"?>
+<p:sld xmlns:a="http://schemas.openxmlformats.org/drawingml/2006/main" xmlns:r="http://schemas.openxmlformats.org/officeDocument/2006/relationships" xmlns:p="http://schemas.openxmlformats.org/presentationml/2006/main">
+  <p:cSld>
+    <p:spTree>
+      <p:nvGrpSpPr>
+        <p:cNvPr id="1" name=""/>
+        <p:cNvGrpSpPr/>
+        <p:nvPr/>
+      </p:nvGrpSpPr>
+      <p:grpSpPr>
+        <a:xfrm>
+          <a:off x="0" y="0"/>
+          <a:ext cx="0" cy="0"/>
+          <a:chOff x="0" y="0"/>
+          <a:chExt cx="0" cy="0"/>
+        </a:xfrm>
+      </p:grpSpPr>
+      <p:pic>
+        <p:nvPicPr>
+          <p:cNvPr id="7" name="Content Placeholder 12" descr="A graph of different colored lines&#10;&#10;Description automatically generated">
+            <a:extLst>
+              <a:ext uri="{FF2B5EF4-FFF2-40B4-BE49-F238E27FC236}">
+                <a16:creationId xmlns:a16="http://schemas.microsoft.com/office/drawing/2014/main" id="{6839652A-B239-F06C-B975-EE8824DA2B87}"/>
+              </a:ext>
+            </a:extLst>
+          </p:cNvPr>
+          <p:cNvPicPr>
+            <a:picLocks noChangeAspect="1"/>
+          </p:cNvPicPr>
+          <p:nvPr/>
+        </p:nvPicPr>
+        <p:blipFill>
+          <a:blip r:embed="rId2">
+            <a:extLst>
+              <a:ext uri="{28A0092B-C50C-407E-A947-70E740481C1C}">
+                <a14:useLocalDpi xmlns:a14="http://schemas.microsoft.com/office/drawing/2010/main" val="0"/>
+              </a:ext>
+            </a:extLst>
+          </a:blip>
+          <a:stretch>
+            <a:fillRect/>
+          </a:stretch>
+        </p:blipFill>
+        <p:spPr>
+          <a:xfrm>
+            <a:off x="65738" y="115410"/>
+            <a:ext cx="12060524" cy="6649373"/>
+          </a:xfrm>
+          <a:prstGeom prst="rect">
+            <a:avLst/>
+          </a:prstGeom>
+        </p:spPr>
+      </p:pic>
+    </p:spTree>
+    <p:extLst>
+      <p:ext uri="{BB962C8B-B14F-4D97-AF65-F5344CB8AC3E}">
+        <p14:creationId xmlns:p14="http://schemas.microsoft.com/office/powerpoint/2010/main" val="2399737576"/>
+      </p:ext>
+    </p:extLst>
+  </p:cSld>
+  <p:clrMapOvr>
+    <a:masterClrMapping/>
+  </p:clrMapOvr>
+  <p:timing>
+    <p:tnLst>
+      <p:par>
+        <p:cTn id="1" dur="indefinite" restart="never" nodeType="tmRoot">
+          <p:childTnLst>
+            <p:seq concurrent="1" nextAc="seek">
+              <p:cTn id="2" dur="indefinite" nodeType="mainSeq">
+                <p:childTnLst>
+                  <p:par>
+                    <p:cTn id="3" fill="hold">
+                      <p:stCondLst>
+                        <p:cond delay="indefinite"/>
+                      </p:stCondLst>
+                      <p:childTnLst>
+                        <p:par>
+                          <p:cTn id="4" fill="hold">
+                            <p:stCondLst>
+                              <p:cond delay="0"/>
+                            </p:stCondLst>
+                            <p:childTnLst>
+                              <p:par>
+                                <p:cTn id="5" presetID="1" presetClass="entr" presetSubtype="0" fill="hold" nodeType="clickEffect">
+                                  <p:stCondLst>
+                                    <p:cond delay="0"/>
+                                  </p:stCondLst>
+                                  <p:childTnLst>
+                                    <p:set>
+                                      <p:cBhvr>
+                                        <p:cTn id="6" dur="1" fill="hold">
+                                          <p:stCondLst>
+                                            <p:cond delay="0"/>
+                                          </p:stCondLst>
+                                        </p:cTn>
+                                        <p:tgtEl>
+                                          <p:spTgt spid="7"/>
+                                        </p:tgtEl>
+                                        <p:attrNameLst>
+                                          <p:attrName>style.visibility</p:attrName>
+                                        </p:attrNameLst>
+                                      </p:cBhvr>
+                                      <p:to>
+                                        <p:strVal val="visible"/>
+                                      </p:to>
+                                    </p:set>
+                                  </p:childTnLst>
+                                </p:cTn>
+                              </p:par>
+                            </p:childTnLst>
+                          </p:cTn>
+                        </p:par>
+                      </p:childTnLst>
+                    </p:cTn>
+                  </p:par>
+                </p:childTnLst>
+              </p:cTn>
+              <p:prevCondLst>
+                <p:cond evt="onPrev" delay="0">
+                  <p:tgtEl>
+                    <p:sldTgt/>
+                  </p:tgtEl>
+                </p:cond>
+              </p:prevCondLst>
+              <p:nextCondLst>
+                <p:cond evt="onNext" delay="0">
+                  <p:tgtEl>
+                    <p:sldTgt/>
+                  </p:tgtEl>
+                </p:cond>
+              </p:nextCondLst>
+            </p:seq>
+          </p:childTnLst>
+        </p:cTn>
+      </p:par>
+    </p:tnLst>
+  </p:timing>
+</p:sld>
+</file>
+
+<file path=ppt/slides/slide7.xml><?xml version="1.0" encoding="utf-8"?>
 <p:sld xmlns:a="http://schemas.openxmlformats.org/drawingml/2006/main" xmlns:r="http://schemas.openxmlformats.org/officeDocument/2006/relationships" xmlns:p="http://schemas.openxmlformats.org/presentationml/2006/main">
   <p:cSld>
     <p:spTree>
@@ -22171,7 +23420,7 @@
 </p:sld>
 </file>
 
-<file path=ppt/slides/slide6.xml><?xml version="1.0" encoding="utf-8"?>
+<file path=ppt/slides/slide8.xml><?xml version="1.0" encoding="utf-8"?>
 <p:sld xmlns:a="http://schemas.openxmlformats.org/drawingml/2006/main" xmlns:r="http://schemas.openxmlformats.org/officeDocument/2006/relationships" xmlns:p="http://schemas.openxmlformats.org/presentationml/2006/main">
   <p:cSld>
     <p:spTree>

</xml_diff>